<commit_message>
Minor fixes to Intro slide deck
</commit_message>
<xml_diff>
--- a/01 intro.pptx
+++ b/01 intro.pptx
@@ -272,7 +272,7 @@
               <a:rPr lang="en-US" smtClean="0">
                 <a:latin typeface="Segoe UI" pitchFamily="34" charset="0"/>
               </a:rPr>
-              <a:t>1/7/19 3:47 PM</a:t>
+              <a:t>3/2/2019 4:47 PM</a:t>
             </a:fld>
             <a:endParaRPr lang="en-US" dirty="0">
               <a:latin typeface="Segoe UI" pitchFamily="34" charset="0"/>
@@ -569,7 +569,7 @@
           <a:p>
             <a:fld id="{D18B56EA-E28F-4F92-9F16-7A6F2501B303}" type="datetime8">
               <a:rPr lang="en-US" smtClean="0"/>
-              <a:t>1/7/19 3:47 PM</a:t>
+              <a:t>3/2/2019 4:47 PM</a:t>
             </a:fld>
             <a:endParaRPr lang="en-US" dirty="0"/>
           </a:p>
@@ -952,7 +952,7 @@
           <a:p>
             <a:fld id="{D18B56EA-E28F-4F92-9F16-7A6F2501B303}" type="datetime8">
               <a:rPr lang="en-US" smtClean="0"/>
-              <a:t>1/7/19 3:47 PM</a:t>
+              <a:t>3/2/2019 4:47 PM</a:t>
             </a:fld>
             <a:endParaRPr lang="en-US" dirty="0"/>
           </a:p>
@@ -1133,7 +1133,7 @@
           <a:p>
             <a:fld id="{D18B56EA-E28F-4F92-9F16-7A6F2501B303}" type="datetime8">
               <a:rPr lang="en-US" smtClean="0"/>
-              <a:t>1/7/19 3:47 PM</a:t>
+              <a:t>3/2/2019 4:47 PM</a:t>
             </a:fld>
             <a:endParaRPr lang="en-US" dirty="0"/>
           </a:p>
@@ -1791,7 +1791,7 @@
           <a:p>
             <a:fld id="{D18B56EA-E28F-4F92-9F16-7A6F2501B303}" type="datetime8">
               <a:rPr lang="en-US" smtClean="0"/>
-              <a:t>1/7/19 3:47 PM</a:t>
+              <a:t>3/2/2019 4:47 PM</a:t>
             </a:fld>
             <a:endParaRPr lang="en-US" dirty="0"/>
           </a:p>
@@ -1972,7 +1972,7 @@
           <a:p>
             <a:fld id="{D18B56EA-E28F-4F92-9F16-7A6F2501B303}" type="datetime8">
               <a:rPr lang="en-US" smtClean="0"/>
-              <a:t>1/7/19 3:47 PM</a:t>
+              <a:t>3/2/2019 4:47 PM</a:t>
             </a:fld>
             <a:endParaRPr lang="en-US" dirty="0"/>
           </a:p>
@@ -2153,7 +2153,7 @@
           <a:p>
             <a:fld id="{D18B56EA-E28F-4F92-9F16-7A6F2501B303}" type="datetime8">
               <a:rPr lang="en-US" smtClean="0"/>
-              <a:t>1/7/19 3:47 PM</a:t>
+              <a:t>3/2/2019 4:47 PM</a:t>
             </a:fld>
             <a:endParaRPr lang="en-US" dirty="0"/>
           </a:p>
@@ -2334,7 +2334,7 @@
           <a:p>
             <a:fld id="{D18B56EA-E28F-4F92-9F16-7A6F2501B303}" type="datetime8">
               <a:rPr lang="en-US" smtClean="0"/>
-              <a:t>1/7/19 3:47 PM</a:t>
+              <a:t>3/2/2019 4:47 PM</a:t>
             </a:fld>
             <a:endParaRPr lang="en-US" dirty="0"/>
           </a:p>
@@ -15979,7 +15979,7 @@
               <a:rPr lang="en-US" sz="1800" dirty="0">
                 <a:latin typeface="+mj-lt"/>
               </a:rPr>
-              <a:t>SharePoint Framework</a:t>
+              <a:t>Overview of the SharePoint Framework</a:t>
             </a:r>
           </a:p>
           <a:p>
@@ -15998,7 +15998,7 @@
                 <a:latin typeface="+mj-lt"/>
                 <a:hlinkClick r:id="rId3"/>
               </a:rPr>
-              <a:t>https://docs.microsoft.com/sharepoint/dev/spfx</a:t>
+              <a:t>https://docs.microsoft.com/sharepoint/dev/spfx/sharepoint-framework-overview</a:t>
             </a:r>
             <a:endParaRPr lang="en-US" sz="1800" dirty="0">
               <a:latin typeface="+mj-lt"/>
@@ -16528,7 +16528,12 @@
             <p:ph type="body" sz="quarter" idx="10"/>
           </p:nvPr>
         </p:nvSpPr>
-        <p:spPr/>
+        <p:spPr>
+          <a:xfrm>
+            <a:off x="464400" y="1212850"/>
+            <a:ext cx="8731115" cy="4853099"/>
+          </a:xfrm>
+        </p:spPr>
         <p:txBody>
           <a:bodyPr/>
           <a:lstStyle/>

</xml_diff>